<commit_message>
Callers-to-Coders - Update 6/10/20
</commit_message>
<xml_diff>
--- a/Lectures/(2) Writing Queries.pptx
+++ b/Lectures/(2) Writing Queries.pptx
@@ -5,7 +5,7 @@
     <p:sldMasterId id="2147483672" r:id="rId1"/>
   </p:sldMasterIdLst>
   <p:notesMasterIdLst>
-    <p:notesMasterId r:id="rId15"/>
+    <p:notesMasterId r:id="rId17"/>
   </p:notesMasterIdLst>
   <p:sldIdLst>
     <p:sldId id="256" r:id="rId2"/>
@@ -18,33 +18,35 @@
     <p:sldId id="265" r:id="rId9"/>
     <p:sldId id="289" r:id="rId10"/>
     <p:sldId id="267" r:id="rId11"/>
-    <p:sldId id="268" r:id="rId12"/>
-    <p:sldId id="269" r:id="rId13"/>
-    <p:sldId id="271" r:id="rId14"/>
+    <p:sldId id="290" r:id="rId12"/>
+    <p:sldId id="268" r:id="rId13"/>
+    <p:sldId id="269" r:id="rId14"/>
+    <p:sldId id="271" r:id="rId15"/>
+    <p:sldId id="270" r:id="rId16"/>
   </p:sldIdLst>
   <p:sldSz cx="12192000" cy="6858000"/>
   <p:notesSz cx="6858000" cy="9144000"/>
   <p:embeddedFontLst>
     <p:embeddedFont>
       <p:font typeface="Calibri" panose="020F0502020204030204" pitchFamily="34" charset="0"/>
-      <p:regular r:id="rId16"/>
-      <p:bold r:id="rId17"/>
-      <p:italic r:id="rId18"/>
-      <p:boldItalic r:id="rId19"/>
+      <p:regular r:id="rId18"/>
+      <p:bold r:id="rId19"/>
+      <p:italic r:id="rId20"/>
+      <p:boldItalic r:id="rId21"/>
     </p:embeddedFont>
     <p:embeddedFont>
       <p:font typeface="Lato" panose="020B0604020202020204" charset="0"/>
-      <p:regular r:id="rId20"/>
-      <p:bold r:id="rId21"/>
-      <p:italic r:id="rId22"/>
-      <p:boldItalic r:id="rId23"/>
+      <p:regular r:id="rId22"/>
+      <p:bold r:id="rId23"/>
+      <p:italic r:id="rId24"/>
+      <p:boldItalic r:id="rId25"/>
     </p:embeddedFont>
     <p:embeddedFont>
       <p:font typeface="Raleway" panose="020B0604020202020204" charset="0"/>
-      <p:regular r:id="rId24"/>
-      <p:bold r:id="rId25"/>
-      <p:italic r:id="rId26"/>
-      <p:boldItalic r:id="rId27"/>
+      <p:regular r:id="rId26"/>
+      <p:bold r:id="rId27"/>
+      <p:italic r:id="rId28"/>
+      <p:boldItalic r:id="rId29"/>
     </p:embeddedFont>
   </p:embeddedFontLst>
   <p:defaultTextStyle>
@@ -1836,6 +1838,115 @@
   <p:cSld>
     <p:spTree>
       <p:nvGrpSpPr>
+        <p:cNvPr id="1" name="Shape 253"/>
+        <p:cNvGrpSpPr/>
+        <p:nvPr/>
+      </p:nvGrpSpPr>
+      <p:grpSpPr>
+        <a:xfrm>
+          <a:off x="0" y="0"/>
+          <a:ext cx="0" cy="0"/>
+          <a:chOff x="0" y="0"/>
+          <a:chExt cx="0" cy="0"/>
+        </a:xfrm>
+      </p:grpSpPr>
+      <p:sp>
+        <p:nvSpPr>
+          <p:cNvPr id="254" name="Google Shape;254;g5038ce4af1_0_362:notes"/>
+          <p:cNvSpPr txBox="1">
+            <a:spLocks noGrp="1"/>
+          </p:cNvSpPr>
+          <p:nvPr>
+            <p:ph type="body" idx="1"/>
+          </p:nvPr>
+        </p:nvSpPr>
+        <p:spPr>
+          <a:xfrm>
+            <a:off x="685800" y="4400550"/>
+            <a:ext cx="5486400" cy="3600600"/>
+          </a:xfrm>
+          <a:prstGeom prst="rect">
+            <a:avLst/>
+          </a:prstGeom>
+        </p:spPr>
+        <p:txBody>
+          <a:bodyPr spcFirstLastPara="1" wrap="square" lIns="91425" tIns="45700" rIns="91425" bIns="45700" anchor="t" anchorCtr="0">
+            <a:noAutofit/>
+          </a:bodyPr>
+          <a:lstStyle/>
+          <a:p>
+            <a:pPr marL="0" lvl="0" indent="0" algn="l" rtl="0">
+              <a:spcBef>
+                <a:spcPts val="0"/>
+              </a:spcBef>
+              <a:spcAft>
+                <a:spcPts val="0"/>
+              </a:spcAft>
+              <a:buNone/>
+            </a:pPr>
+            <a:endParaRPr dirty="0"/>
+          </a:p>
+        </p:txBody>
+      </p:sp>
+      <p:sp>
+        <p:nvSpPr>
+          <p:cNvPr id="255" name="Google Shape;255;g5038ce4af1_0_362:notes"/>
+          <p:cNvSpPr>
+            <a:spLocks noGrp="1" noRot="1" noChangeAspect="1"/>
+          </p:cNvSpPr>
+          <p:nvPr>
+            <p:ph type="sldImg" idx="2"/>
+          </p:nvPr>
+        </p:nvSpPr>
+        <p:spPr>
+          <a:xfrm>
+            <a:off x="685800" y="1143000"/>
+            <a:ext cx="5486400" cy="3086100"/>
+          </a:xfrm>
+          <a:custGeom>
+            <a:avLst/>
+            <a:gdLst/>
+            <a:ahLst/>
+            <a:cxnLst/>
+            <a:rect l="l" t="t" r="r" b="b"/>
+            <a:pathLst>
+              <a:path w="120000" h="120000" extrusionOk="0">
+                <a:moveTo>
+                  <a:pt x="0" y="0"/>
+                </a:moveTo>
+                <a:lnTo>
+                  <a:pt x="120000" y="0"/>
+                </a:lnTo>
+                <a:lnTo>
+                  <a:pt x="120000" y="120000"/>
+                </a:lnTo>
+                <a:lnTo>
+                  <a:pt x="0" y="120000"/>
+                </a:lnTo>
+                <a:close/>
+              </a:path>
+            </a:pathLst>
+          </a:custGeom>
+        </p:spPr>
+      </p:sp>
+    </p:spTree>
+    <p:extLst>
+      <p:ext uri="{BB962C8B-B14F-4D97-AF65-F5344CB8AC3E}">
+        <p14:creationId xmlns:p14="http://schemas.microsoft.com/office/powerpoint/2010/main" val="1149843511"/>
+      </p:ext>
+    </p:extLst>
+  </p:cSld>
+  <p:clrMapOvr>
+    <a:masterClrMapping/>
+  </p:clrMapOvr>
+</p:notes>
+</file>
+
+<file path=ppt/notesSlides/notesSlide12.xml><?xml version="1.0" encoding="utf-8"?>
+<p:notes xmlns:a="http://schemas.openxmlformats.org/drawingml/2006/main" xmlns:r="http://schemas.openxmlformats.org/officeDocument/2006/relationships" xmlns:p="http://schemas.openxmlformats.org/presentationml/2006/main" showMasterSp="0" showMasterPhAnim="0">
+  <p:cSld>
+    <p:spTree>
+      <p:nvGrpSpPr>
         <p:cNvPr id="1" name="Shape 260"/>
         <p:cNvGrpSpPr/>
         <p:nvPr/>
@@ -2264,7 +2375,7 @@
 </p:notes>
 </file>
 
-<file path=ppt/notesSlides/notesSlide12.xml><?xml version="1.0" encoding="utf-8"?>
+<file path=ppt/notesSlides/notesSlide13.xml><?xml version="1.0" encoding="utf-8"?>
 <p:notes xmlns:a="http://schemas.openxmlformats.org/drawingml/2006/main" xmlns:r="http://schemas.openxmlformats.org/officeDocument/2006/relationships" xmlns:p="http://schemas.openxmlformats.org/presentationml/2006/main" showMasterSp="0" showMasterPhAnim="0">
   <p:cSld>
     <p:spTree>
@@ -2368,7 +2479,7 @@
 </p:notes>
 </file>
 
-<file path=ppt/notesSlides/notesSlide13.xml><?xml version="1.0" encoding="utf-8"?>
+<file path=ppt/notesSlides/notesSlide14.xml><?xml version="1.0" encoding="utf-8"?>
 <p:notes xmlns:a="http://schemas.openxmlformats.org/drawingml/2006/main" xmlns:r="http://schemas.openxmlformats.org/officeDocument/2006/relationships" xmlns:p="http://schemas.openxmlformats.org/presentationml/2006/main" showMasterSp="0" showMasterPhAnim="0">
   <p:cSld>
     <p:spTree>
@@ -2504,13 +2615,134 @@
             </a:pPr>
             <a:fld id="{00000000-1234-1234-1234-123412341234}" type="slidenum">
               <a:rPr lang="en-US"/>
-              <a:t>13</a:t>
+              <a:t>14</a:t>
             </a:fld>
             <a:endParaRPr/>
           </a:p>
         </p:txBody>
       </p:sp>
     </p:spTree>
+  </p:cSld>
+  <p:clrMapOvr>
+    <a:masterClrMapping/>
+  </p:clrMapOvr>
+</p:notes>
+</file>
+
+<file path=ppt/notesSlides/notesSlide15.xml><?xml version="1.0" encoding="utf-8"?>
+<p:notes xmlns:a="http://schemas.openxmlformats.org/drawingml/2006/main" xmlns:r="http://schemas.openxmlformats.org/officeDocument/2006/relationships" xmlns:p="http://schemas.openxmlformats.org/presentationml/2006/main" showMasterSp="0" showMasterPhAnim="0">
+  <p:cSld>
+    <p:spTree>
+      <p:nvGrpSpPr>
+        <p:cNvPr id="1" name="Shape 269"/>
+        <p:cNvGrpSpPr/>
+        <p:nvPr/>
+      </p:nvGrpSpPr>
+      <p:grpSpPr>
+        <a:xfrm>
+          <a:off x="0" y="0"/>
+          <a:ext cx="0" cy="0"/>
+          <a:chOff x="0" y="0"/>
+          <a:chExt cx="0" cy="0"/>
+        </a:xfrm>
+      </p:grpSpPr>
+      <p:sp>
+        <p:nvSpPr>
+          <p:cNvPr id="270" name="Google Shape;270;g5d39b7d912_0_92:notes"/>
+          <p:cNvSpPr txBox="1">
+            <a:spLocks noGrp="1"/>
+          </p:cNvSpPr>
+          <p:nvPr>
+            <p:ph type="body" idx="1"/>
+          </p:nvPr>
+        </p:nvSpPr>
+        <p:spPr>
+          <a:xfrm>
+            <a:off x="685800" y="4400550"/>
+            <a:ext cx="5486400" cy="3600600"/>
+          </a:xfrm>
+          <a:prstGeom prst="rect">
+            <a:avLst/>
+          </a:prstGeom>
+        </p:spPr>
+        <p:txBody>
+          <a:bodyPr spcFirstLastPara="1" wrap="square" lIns="91425" tIns="45700" rIns="91425" bIns="45700" anchor="t" anchorCtr="0">
+            <a:noAutofit/>
+          </a:bodyPr>
+          <a:lstStyle/>
+          <a:p>
+            <a:pPr marL="0" lvl="0" indent="0" algn="l" rtl="0">
+              <a:spcBef>
+                <a:spcPts val="0"/>
+              </a:spcBef>
+              <a:spcAft>
+                <a:spcPts val="0"/>
+              </a:spcAft>
+              <a:buNone/>
+            </a:pPr>
+            <a:r>
+              <a:rPr lang="en-US">
+                <a:solidFill>
+                  <a:srgbClr val="000000"/>
+                </a:solidFill>
+              </a:rPr>
+              <a:t>A derived table is the result of a query that looks like a table.</a:t>
+            </a:r>
+            <a:endParaRPr>
+              <a:solidFill>
+                <a:srgbClr val="000000"/>
+              </a:solidFill>
+            </a:endParaRPr>
+          </a:p>
+        </p:txBody>
+      </p:sp>
+      <p:sp>
+        <p:nvSpPr>
+          <p:cNvPr id="271" name="Google Shape;271;g5d39b7d912_0_92:notes"/>
+          <p:cNvSpPr>
+            <a:spLocks noGrp="1" noRot="1" noChangeAspect="1"/>
+          </p:cNvSpPr>
+          <p:nvPr>
+            <p:ph type="sldImg" idx="2"/>
+          </p:nvPr>
+        </p:nvSpPr>
+        <p:spPr>
+          <a:xfrm>
+            <a:off x="685800" y="1143000"/>
+            <a:ext cx="5486400" cy="3086100"/>
+          </a:xfrm>
+          <a:custGeom>
+            <a:avLst/>
+            <a:gdLst/>
+            <a:ahLst/>
+            <a:cxnLst/>
+            <a:rect l="l" t="t" r="r" b="b"/>
+            <a:pathLst>
+              <a:path w="120000" h="120000" extrusionOk="0">
+                <a:moveTo>
+                  <a:pt x="0" y="0"/>
+                </a:moveTo>
+                <a:lnTo>
+                  <a:pt x="120000" y="0"/>
+                </a:lnTo>
+                <a:lnTo>
+                  <a:pt x="120000" y="120000"/>
+                </a:lnTo>
+                <a:lnTo>
+                  <a:pt x="0" y="120000"/>
+                </a:lnTo>
+                <a:close/>
+              </a:path>
+            </a:pathLst>
+          </a:custGeom>
+        </p:spPr>
+      </p:sp>
+    </p:spTree>
+    <p:extLst>
+      <p:ext uri="{BB962C8B-B14F-4D97-AF65-F5344CB8AC3E}">
+        <p14:creationId xmlns:p14="http://schemas.microsoft.com/office/powerpoint/2010/main" val="2075916008"/>
+      </p:ext>
+    </p:extLst>
   </p:cSld>
   <p:clrMapOvr>
     <a:masterClrMapping/>
@@ -12282,6 +12514,191 @@
   <p:cSld>
     <p:spTree>
       <p:nvGrpSpPr>
+        <p:cNvPr id="1" name="Shape 256"/>
+        <p:cNvGrpSpPr/>
+        <p:nvPr/>
+      </p:nvGrpSpPr>
+      <p:grpSpPr>
+        <a:xfrm>
+          <a:off x="0" y="0"/>
+          <a:ext cx="0" cy="0"/>
+          <a:chOff x="0" y="0"/>
+          <a:chExt cx="0" cy="0"/>
+        </a:xfrm>
+      </p:grpSpPr>
+      <p:sp>
+        <p:nvSpPr>
+          <p:cNvPr id="257" name="Google Shape;257;p38"/>
+          <p:cNvSpPr txBox="1">
+            <a:spLocks noGrp="1"/>
+          </p:cNvSpPr>
+          <p:nvPr>
+            <p:ph type="ctrTitle"/>
+          </p:nvPr>
+        </p:nvSpPr>
+        <p:spPr>
+          <a:xfrm>
+            <a:off x="913795" y="609600"/>
+            <a:ext cx="10353900" cy="970500"/>
+          </a:xfrm>
+          <a:prstGeom prst="rect">
+            <a:avLst/>
+          </a:prstGeom>
+          <a:noFill/>
+          <a:ln>
+            <a:noFill/>
+          </a:ln>
+          <a:effectLst>
+            <a:outerShdw blurRad="25400">
+              <a:srgbClr val="000000">
+                <a:alpha val="45880"/>
+              </a:srgbClr>
+            </a:outerShdw>
+          </a:effectLst>
+        </p:spPr>
+        <p:txBody>
+          <a:bodyPr spcFirstLastPara="1" wrap="square" lIns="91425" tIns="45700" rIns="91425" bIns="45700" anchor="ctr" anchorCtr="0">
+            <a:noAutofit/>
+          </a:bodyPr>
+          <a:lstStyle/>
+          <a:p>
+            <a:pPr marL="0" lvl="0" indent="0" algn="l" rtl="0">
+              <a:spcBef>
+                <a:spcPts val="0"/>
+              </a:spcBef>
+              <a:spcAft>
+                <a:spcPts val="0"/>
+              </a:spcAft>
+              <a:buClr>
+                <a:schemeClr val="lt2"/>
+              </a:buClr>
+              <a:buSzPts val="4000"/>
+              <a:buFont typeface="Lustria"/>
+              <a:buNone/>
+            </a:pPr>
+            <a:r>
+              <a:rPr lang="en-US" sz="4800" dirty="0"/>
+              <a:t>Subqueries - Example</a:t>
+            </a:r>
+            <a:endParaRPr sz="4800" dirty="0"/>
+          </a:p>
+        </p:txBody>
+      </p:sp>
+      <p:pic>
+        <p:nvPicPr>
+          <p:cNvPr id="5" name="Picture 4" descr="A screenshot of a cell phone&#10;&#10;Description automatically generated">
+            <a:extLst>
+              <a:ext uri="{FF2B5EF4-FFF2-40B4-BE49-F238E27FC236}">
+                <a16:creationId xmlns:a16="http://schemas.microsoft.com/office/drawing/2014/main" id="{D460A89F-F8D8-4672-94D4-F1B5326C8519}"/>
+              </a:ext>
+            </a:extLst>
+          </p:cNvPr>
+          <p:cNvPicPr>
+            <a:picLocks noChangeAspect="1"/>
+          </p:cNvPicPr>
+          <p:nvPr/>
+        </p:nvPicPr>
+        <p:blipFill>
+          <a:blip r:embed="rId3"/>
+          <a:stretch>
+            <a:fillRect/>
+          </a:stretch>
+        </p:blipFill>
+        <p:spPr>
+          <a:xfrm>
+            <a:off x="1005744" y="3059772"/>
+            <a:ext cx="10353900" cy="3567059"/>
+          </a:xfrm>
+          <a:prstGeom prst="rect">
+            <a:avLst/>
+          </a:prstGeom>
+        </p:spPr>
+      </p:pic>
+      <p:pic>
+        <p:nvPicPr>
+          <p:cNvPr id="6" name="Picture 5">
+            <a:extLst>
+              <a:ext uri="{FF2B5EF4-FFF2-40B4-BE49-F238E27FC236}">
+                <a16:creationId xmlns:a16="http://schemas.microsoft.com/office/drawing/2014/main" id="{E65AE0B4-CDBC-49E2-9EC7-B8453F619B61}"/>
+              </a:ext>
+            </a:extLst>
+          </p:cNvPr>
+          <p:cNvPicPr>
+            <a:picLocks noChangeAspect="1"/>
+          </p:cNvPicPr>
+          <p:nvPr/>
+        </p:nvPicPr>
+        <p:blipFill>
+          <a:blip r:embed="rId4"/>
+          <a:stretch>
+            <a:fillRect/>
+          </a:stretch>
+        </p:blipFill>
+        <p:spPr>
+          <a:xfrm>
+            <a:off x="1005743" y="1677578"/>
+            <a:ext cx="10353900" cy="2042844"/>
+          </a:xfrm>
+          <a:prstGeom prst="rect">
+            <a:avLst/>
+          </a:prstGeom>
+        </p:spPr>
+      </p:pic>
+      <p:sp>
+        <p:nvSpPr>
+          <p:cNvPr id="7" name="Rectangle 6">
+            <a:extLst>
+              <a:ext uri="{FF2B5EF4-FFF2-40B4-BE49-F238E27FC236}">
+                <a16:creationId xmlns:a16="http://schemas.microsoft.com/office/drawing/2014/main" id="{DF8556DE-95EE-450C-A687-0E644F5E4C8C}"/>
+              </a:ext>
+            </a:extLst>
+          </p:cNvPr>
+          <p:cNvSpPr/>
+          <p:nvPr/>
+        </p:nvSpPr>
+        <p:spPr>
+          <a:xfrm>
+            <a:off x="6888547" y="6319054"/>
+            <a:ext cx="4471096" cy="307777"/>
+          </a:xfrm>
+          <a:prstGeom prst="rect">
+            <a:avLst/>
+          </a:prstGeom>
+        </p:spPr>
+        <p:txBody>
+          <a:bodyPr wrap="none">
+            <a:spAutoFit/>
+          </a:bodyPr>
+          <a:lstStyle/>
+          <a:p>
+            <a:r>
+              <a:rPr lang="en-US" dirty="0">
+                <a:hlinkClick r:id="rId5"/>
+              </a:rPr>
+              <a:t>Source: https://datapractices.org/courseware/2_7.html</a:t>
+            </a:r>
+            <a:endParaRPr lang="en-US" dirty="0"/>
+          </a:p>
+        </p:txBody>
+      </p:sp>
+    </p:spTree>
+    <p:extLst>
+      <p:ext uri="{BB962C8B-B14F-4D97-AF65-F5344CB8AC3E}">
+        <p14:creationId xmlns:p14="http://schemas.microsoft.com/office/powerpoint/2010/main" val="4247689991"/>
+      </p:ext>
+    </p:extLst>
+  </p:cSld>
+  <p:clrMapOvr>
+    <a:masterClrMapping/>
+  </p:clrMapOvr>
+</p:sld>
+</file>
+
+<file path=ppt/slides/slide12.xml><?xml version="1.0" encoding="utf-8"?>
+<p:sld xmlns:a="http://schemas.openxmlformats.org/drawingml/2006/main" xmlns:r="http://schemas.openxmlformats.org/officeDocument/2006/relationships" xmlns:p="http://schemas.openxmlformats.org/presentationml/2006/main">
+  <p:cSld>
+    <p:spTree>
+      <p:nvGrpSpPr>
         <p:cNvPr id="1" name="Shape 263"/>
         <p:cNvGrpSpPr/>
         <p:nvPr/>
@@ -13016,7 +13433,7 @@
 </p:sld>
 </file>
 
-<file path=ppt/slides/slide12.xml><?xml version="1.0" encoding="utf-8"?>
+<file path=ppt/slides/slide13.xml><?xml version="1.0" encoding="utf-8"?>
 <p:sld xmlns:a="http://schemas.openxmlformats.org/drawingml/2006/main" xmlns:r="http://schemas.openxmlformats.org/officeDocument/2006/relationships" xmlns:p="http://schemas.openxmlformats.org/presentationml/2006/main">
   <p:cSld>
     <p:spTree>
@@ -13397,7 +13814,7 @@
 </p:sld>
 </file>
 
-<file path=ppt/slides/slide13.xml><?xml version="1.0" encoding="utf-8"?>
+<file path=ppt/slides/slide14.xml><?xml version="1.0" encoding="utf-8"?>
 <p:sld xmlns:a="http://schemas.openxmlformats.org/drawingml/2006/main" xmlns:r="http://schemas.openxmlformats.org/officeDocument/2006/relationships" xmlns:p="http://schemas.openxmlformats.org/presentationml/2006/main">
   <p:cSld>
     <p:spTree>
@@ -13691,6 +14108,647 @@
         </p:spPr>
       </p:pic>
     </p:spTree>
+  </p:cSld>
+  <p:clrMapOvr>
+    <a:masterClrMapping/>
+  </p:clrMapOvr>
+</p:sld>
+</file>
+
+<file path=ppt/slides/slide15.xml><?xml version="1.0" encoding="utf-8"?>
+<p:sld xmlns:a="http://schemas.openxmlformats.org/drawingml/2006/main" xmlns:r="http://schemas.openxmlformats.org/officeDocument/2006/relationships" xmlns:p="http://schemas.openxmlformats.org/presentationml/2006/main">
+  <p:cSld>
+    <p:spTree>
+      <p:nvGrpSpPr>
+        <p:cNvPr id="1" name="Shape 272"/>
+        <p:cNvGrpSpPr/>
+        <p:nvPr/>
+      </p:nvGrpSpPr>
+      <p:grpSpPr>
+        <a:xfrm>
+          <a:off x="0" y="0"/>
+          <a:ext cx="0" cy="0"/>
+          <a:chOff x="0" y="0"/>
+          <a:chExt cx="0" cy="0"/>
+        </a:xfrm>
+      </p:grpSpPr>
+      <p:sp>
+        <p:nvSpPr>
+          <p:cNvPr id="273" name="Google Shape;273;p39"/>
+          <p:cNvSpPr txBox="1">
+            <a:spLocks noGrp="1"/>
+          </p:cNvSpPr>
+          <p:nvPr>
+            <p:ph type="ctrTitle"/>
+          </p:nvPr>
+        </p:nvSpPr>
+        <p:spPr>
+          <a:xfrm>
+            <a:off x="913795" y="609600"/>
+            <a:ext cx="10353900" cy="970500"/>
+          </a:xfrm>
+          <a:prstGeom prst="rect">
+            <a:avLst/>
+          </a:prstGeom>
+          <a:noFill/>
+          <a:ln>
+            <a:noFill/>
+          </a:ln>
+          <a:effectLst>
+            <a:outerShdw blurRad="25400">
+              <a:srgbClr val="000000">
+                <a:alpha val="45880"/>
+              </a:srgbClr>
+            </a:outerShdw>
+          </a:effectLst>
+        </p:spPr>
+        <p:txBody>
+          <a:bodyPr spcFirstLastPara="1" wrap="square" lIns="91425" tIns="45700" rIns="91425" bIns="45700" anchor="ctr" anchorCtr="0">
+            <a:noAutofit/>
+          </a:bodyPr>
+          <a:lstStyle/>
+          <a:p>
+            <a:pPr marL="0" lvl="0" indent="0" algn="l" rtl="0">
+              <a:spcBef>
+                <a:spcPts val="0"/>
+              </a:spcBef>
+              <a:spcAft>
+                <a:spcPts val="0"/>
+              </a:spcAft>
+              <a:buClr>
+                <a:schemeClr val="lt2"/>
+              </a:buClr>
+              <a:buSzPts val="4000"/>
+              <a:buFont typeface="Lustria"/>
+              <a:buNone/>
+            </a:pPr>
+            <a:r>
+              <a:rPr lang="en-US" sz="3600" dirty="0"/>
+              <a:t>Data Import - MySQL</a:t>
+            </a:r>
+            <a:endParaRPr sz="3600" dirty="0"/>
+          </a:p>
+        </p:txBody>
+      </p:sp>
+      <p:sp>
+        <p:nvSpPr>
+          <p:cNvPr id="6" name="Google Shape;274;p39">
+            <a:extLst>
+              <a:ext uri="{FF2B5EF4-FFF2-40B4-BE49-F238E27FC236}">
+                <a16:creationId xmlns:a16="http://schemas.microsoft.com/office/drawing/2014/main" id="{DE5AC372-ECFF-4985-AFE6-A772DB5DC527}"/>
+              </a:ext>
+            </a:extLst>
+          </p:cNvPr>
+          <p:cNvSpPr txBox="1"/>
+          <p:nvPr/>
+        </p:nvSpPr>
+        <p:spPr>
+          <a:xfrm>
+            <a:off x="1001549" y="1661407"/>
+            <a:ext cx="10693915" cy="880878"/>
+          </a:xfrm>
+          <a:prstGeom prst="rect">
+            <a:avLst/>
+          </a:prstGeom>
+          <a:noFill/>
+          <a:ln>
+            <a:noFill/>
+          </a:ln>
+        </p:spPr>
+        <p:txBody>
+          <a:bodyPr spcFirstLastPara="1" wrap="square" lIns="91425" tIns="91425" rIns="91425" bIns="91425" anchor="t" anchorCtr="0">
+            <a:noAutofit/>
+          </a:bodyPr>
+          <a:lstStyle/>
+          <a:p>
+            <a:pPr marL="0" lvl="0" indent="0" algn="l" rtl="0">
+              <a:lnSpc>
+                <a:spcPct val="115000"/>
+              </a:lnSpc>
+              <a:spcBef>
+                <a:spcPts val="0"/>
+              </a:spcBef>
+              <a:spcAft>
+                <a:spcPts val="0"/>
+              </a:spcAft>
+              <a:buNone/>
+            </a:pPr>
+            <a:r>
+              <a:rPr lang="en-US" sz="2400" dirty="0">
+                <a:latin typeface="Lato"/>
+                <a:ea typeface="Lato"/>
+                <a:cs typeface="Lato"/>
+                <a:sym typeface="Lato"/>
+              </a:rPr>
+              <a:t>Purpose -  Import Demographic Data, for use with COVID-19 Dataset</a:t>
+            </a:r>
+            <a:endParaRPr sz="2000" dirty="0">
+              <a:solidFill>
+                <a:schemeClr val="accent1"/>
+              </a:solidFill>
+              <a:latin typeface="Lato"/>
+              <a:ea typeface="Lato"/>
+              <a:cs typeface="Lato"/>
+              <a:sym typeface="Lato"/>
+            </a:endParaRPr>
+          </a:p>
+        </p:txBody>
+      </p:sp>
+      <p:pic>
+        <p:nvPicPr>
+          <p:cNvPr id="2" name="Picture 1">
+            <a:extLst>
+              <a:ext uri="{FF2B5EF4-FFF2-40B4-BE49-F238E27FC236}">
+                <a16:creationId xmlns:a16="http://schemas.microsoft.com/office/drawing/2014/main" id="{59AB57A5-4B58-4CFB-99B9-B8811877AE2E}"/>
+              </a:ext>
+            </a:extLst>
+          </p:cNvPr>
+          <p:cNvPicPr>
+            <a:picLocks noChangeAspect="1"/>
+          </p:cNvPicPr>
+          <p:nvPr/>
+        </p:nvPicPr>
+        <p:blipFill>
+          <a:blip r:embed="rId3"/>
+          <a:stretch>
+            <a:fillRect/>
+          </a:stretch>
+        </p:blipFill>
+        <p:spPr>
+          <a:xfrm>
+            <a:off x="6728001" y="2836407"/>
+            <a:ext cx="5057775" cy="2428875"/>
+          </a:xfrm>
+          <a:prstGeom prst="rect">
+            <a:avLst/>
+          </a:prstGeom>
+        </p:spPr>
+      </p:pic>
+      <p:sp>
+        <p:nvSpPr>
+          <p:cNvPr id="8" name="Google Shape;274;p39">
+            <a:extLst>
+              <a:ext uri="{FF2B5EF4-FFF2-40B4-BE49-F238E27FC236}">
+                <a16:creationId xmlns:a16="http://schemas.microsoft.com/office/drawing/2014/main" id="{C2AF4288-EF23-4A7E-80AF-410291B879BE}"/>
+              </a:ext>
+            </a:extLst>
+          </p:cNvPr>
+          <p:cNvSpPr txBox="1"/>
+          <p:nvPr/>
+        </p:nvSpPr>
+        <p:spPr>
+          <a:xfrm>
+            <a:off x="573780" y="2363895"/>
+            <a:ext cx="10693915" cy="945982"/>
+          </a:xfrm>
+          <a:prstGeom prst="rect">
+            <a:avLst/>
+          </a:prstGeom>
+          <a:noFill/>
+          <a:ln>
+            <a:noFill/>
+          </a:ln>
+        </p:spPr>
+        <p:txBody>
+          <a:bodyPr spcFirstLastPara="1" wrap="square" lIns="91425" tIns="91425" rIns="91425" bIns="91425" anchor="t" anchorCtr="0">
+            <a:noAutofit/>
+          </a:bodyPr>
+          <a:lstStyle/>
+          <a:p>
+            <a:pPr marL="0" lvl="0" indent="0" algn="l" rtl="0">
+              <a:lnSpc>
+                <a:spcPct val="115000"/>
+              </a:lnSpc>
+              <a:spcBef>
+                <a:spcPts val="0"/>
+              </a:spcBef>
+              <a:spcAft>
+                <a:spcPts val="0"/>
+              </a:spcAft>
+              <a:buNone/>
+            </a:pPr>
+            <a:r>
+              <a:rPr lang="en-US" sz="2400" b="1" u="sng" dirty="0">
+                <a:latin typeface="Lato"/>
+                <a:ea typeface="Lato"/>
+                <a:cs typeface="Lato"/>
+                <a:sym typeface="Lato"/>
+              </a:rPr>
+              <a:t>STEPS</a:t>
+            </a:r>
+          </a:p>
+          <a:p>
+            <a:pPr marL="457200" lvl="0" indent="-457200" algn="l" rtl="0">
+              <a:lnSpc>
+                <a:spcPct val="115000"/>
+              </a:lnSpc>
+              <a:spcBef>
+                <a:spcPts val="0"/>
+              </a:spcBef>
+              <a:spcAft>
+                <a:spcPts val="0"/>
+              </a:spcAft>
+              <a:buAutoNum type="arabicParenR"/>
+            </a:pPr>
+            <a:r>
+              <a:rPr lang="en-US" sz="2000" dirty="0">
+                <a:solidFill>
+                  <a:schemeClr val="accent1"/>
+                </a:solidFill>
+                <a:latin typeface="Lato"/>
+                <a:ea typeface="Lato"/>
+                <a:cs typeface="Lato"/>
+                <a:sym typeface="Lato"/>
+              </a:rPr>
+              <a:t>Analyze Dataset – Column lengths &amp; types</a:t>
+            </a:r>
+          </a:p>
+          <a:p>
+            <a:pPr marL="457200" lvl="0" indent="-457200" algn="l" rtl="0">
+              <a:lnSpc>
+                <a:spcPct val="115000"/>
+              </a:lnSpc>
+              <a:spcBef>
+                <a:spcPts val="0"/>
+              </a:spcBef>
+              <a:spcAft>
+                <a:spcPts val="0"/>
+              </a:spcAft>
+              <a:buAutoNum type="arabicParenR"/>
+            </a:pPr>
+            <a:r>
+              <a:rPr lang="en-US" sz="2000" dirty="0">
+                <a:solidFill>
+                  <a:schemeClr val="accent1"/>
+                </a:solidFill>
+                <a:latin typeface="Lato"/>
+                <a:ea typeface="Lato"/>
+                <a:cs typeface="Lato"/>
+                <a:sym typeface="Lato"/>
+              </a:rPr>
+              <a:t>Define &amp; </a:t>
+            </a:r>
+            <a:r>
+              <a:rPr lang="en-US" sz="2000" u="sng" dirty="0">
+                <a:solidFill>
+                  <a:schemeClr val="accent1"/>
+                </a:solidFill>
+                <a:latin typeface="Lato"/>
+                <a:ea typeface="Lato"/>
+                <a:cs typeface="Lato"/>
+                <a:sym typeface="Lato"/>
+              </a:rPr>
+              <a:t>Create Table</a:t>
+            </a:r>
+            <a:r>
+              <a:rPr lang="en-US" sz="2000" dirty="0">
+                <a:solidFill>
+                  <a:schemeClr val="accent1"/>
+                </a:solidFill>
+                <a:latin typeface="Lato"/>
+                <a:ea typeface="Lato"/>
+                <a:cs typeface="Lato"/>
+                <a:sym typeface="Lato"/>
+              </a:rPr>
+              <a:t>, based on CSV Columns</a:t>
+            </a:r>
+          </a:p>
+          <a:p>
+            <a:pPr marL="457200" lvl="0" indent="-457200" algn="l" rtl="0">
+              <a:lnSpc>
+                <a:spcPct val="115000"/>
+              </a:lnSpc>
+              <a:spcBef>
+                <a:spcPts val="0"/>
+              </a:spcBef>
+              <a:spcAft>
+                <a:spcPts val="0"/>
+              </a:spcAft>
+              <a:buAutoNum type="arabicParenR"/>
+            </a:pPr>
+            <a:r>
+              <a:rPr lang="en-US" sz="2000" dirty="0">
+                <a:solidFill>
+                  <a:schemeClr val="accent1"/>
+                </a:solidFill>
+                <a:latin typeface="Lato"/>
+                <a:ea typeface="Lato"/>
+                <a:cs typeface="Lato"/>
+                <a:sym typeface="Lato"/>
+              </a:rPr>
+              <a:t>Import Data Using “Table Import Wizard”</a:t>
+            </a:r>
+          </a:p>
+          <a:p>
+            <a:pPr lvl="2">
+              <a:lnSpc>
+                <a:spcPct val="115000"/>
+              </a:lnSpc>
+            </a:pPr>
+            <a:r>
+              <a:rPr lang="en-US" sz="2000" dirty="0">
+                <a:solidFill>
+                  <a:schemeClr val="accent1"/>
+                </a:solidFill>
+                <a:latin typeface="Lato"/>
+                <a:ea typeface="Lato"/>
+                <a:cs typeface="Lato"/>
+                <a:sym typeface="Lato"/>
+              </a:rPr>
+              <a:t>	- Right-Click Table</a:t>
+            </a:r>
+          </a:p>
+          <a:p>
+            <a:pPr lvl="2">
+              <a:lnSpc>
+                <a:spcPct val="115000"/>
+              </a:lnSpc>
+            </a:pPr>
+            <a:r>
+              <a:rPr lang="en-US" sz="2000" dirty="0">
+                <a:solidFill>
+                  <a:schemeClr val="accent1"/>
+                </a:solidFill>
+                <a:latin typeface="Lato"/>
+                <a:ea typeface="Lato"/>
+                <a:cs typeface="Lato"/>
+                <a:sym typeface="Lato"/>
+              </a:rPr>
+              <a:t>	- Select “Table Data Import Wizard”</a:t>
+            </a:r>
+          </a:p>
+          <a:p>
+            <a:pPr marL="457200" lvl="0" indent="-457200" algn="l" rtl="0">
+              <a:lnSpc>
+                <a:spcPct val="115000"/>
+              </a:lnSpc>
+              <a:spcBef>
+                <a:spcPts val="0"/>
+              </a:spcBef>
+              <a:spcAft>
+                <a:spcPts val="0"/>
+              </a:spcAft>
+              <a:buAutoNum type="arabicParenR"/>
+            </a:pPr>
+            <a:r>
+              <a:rPr lang="en-US" sz="2000" dirty="0">
+                <a:solidFill>
+                  <a:schemeClr val="accent1"/>
+                </a:solidFill>
+                <a:latin typeface="Lato"/>
+                <a:ea typeface="Lato"/>
+                <a:cs typeface="Lato"/>
+                <a:sym typeface="Lato"/>
+              </a:rPr>
+              <a:t>Within the “Table Import Wizard”</a:t>
+            </a:r>
+          </a:p>
+          <a:p>
+            <a:pPr lvl="2">
+              <a:lnSpc>
+                <a:spcPct val="115000"/>
+              </a:lnSpc>
+            </a:pPr>
+            <a:r>
+              <a:rPr lang="en-US" sz="2000" dirty="0">
+                <a:solidFill>
+                  <a:schemeClr val="accent1"/>
+                </a:solidFill>
+                <a:latin typeface="Lato"/>
+                <a:ea typeface="Lato"/>
+                <a:cs typeface="Lato"/>
+                <a:sym typeface="Lato"/>
+              </a:rPr>
+              <a:t>	- Select CSV file</a:t>
+            </a:r>
+          </a:p>
+          <a:p>
+            <a:pPr lvl="2">
+              <a:lnSpc>
+                <a:spcPct val="115000"/>
+              </a:lnSpc>
+            </a:pPr>
+            <a:r>
+              <a:rPr lang="en-US" sz="2000" dirty="0">
+                <a:solidFill>
+                  <a:schemeClr val="accent1"/>
+                </a:solidFill>
+                <a:latin typeface="Lato"/>
+                <a:ea typeface="Lato"/>
+                <a:cs typeface="Lato"/>
+                <a:sym typeface="Lato"/>
+              </a:rPr>
+              <a:t>	- Select Destination – Use Existing Table</a:t>
+            </a:r>
+          </a:p>
+          <a:p>
+            <a:pPr lvl="2">
+              <a:lnSpc>
+                <a:spcPct val="115000"/>
+              </a:lnSpc>
+            </a:pPr>
+            <a:r>
+              <a:rPr lang="en-US" sz="2000" dirty="0">
+                <a:solidFill>
+                  <a:schemeClr val="accent1"/>
+                </a:solidFill>
+                <a:latin typeface="Lato"/>
+                <a:ea typeface="Lato"/>
+                <a:cs typeface="Lato"/>
+                <a:sym typeface="Lato"/>
+              </a:rPr>
+              <a:t>	-  Configure Import Setting – Column Types, Encoding (utf-8) </a:t>
+            </a:r>
+          </a:p>
+          <a:p>
+            <a:pPr marL="457200" lvl="0" indent="-457200" algn="l" rtl="0">
+              <a:lnSpc>
+                <a:spcPct val="115000"/>
+              </a:lnSpc>
+              <a:spcBef>
+                <a:spcPts val="0"/>
+              </a:spcBef>
+              <a:spcAft>
+                <a:spcPts val="0"/>
+              </a:spcAft>
+              <a:buAutoNum type="arabicParenR"/>
+            </a:pPr>
+            <a:r>
+              <a:rPr lang="en-US" sz="2000" dirty="0">
+                <a:solidFill>
+                  <a:schemeClr val="accent1"/>
+                </a:solidFill>
+                <a:latin typeface="Lato"/>
+                <a:ea typeface="Lato"/>
+                <a:cs typeface="Lato"/>
+                <a:sym typeface="Lato"/>
+              </a:rPr>
+              <a:t>Import Data – Click Next, Monitor Import Log</a:t>
+            </a:r>
+          </a:p>
+          <a:p>
+            <a:pPr lvl="1">
+              <a:lnSpc>
+                <a:spcPct val="115000"/>
+              </a:lnSpc>
+            </a:pPr>
+            <a:r>
+              <a:rPr lang="en-US" sz="2000" dirty="0">
+                <a:solidFill>
+                  <a:schemeClr val="accent1"/>
+                </a:solidFill>
+                <a:latin typeface="Lato"/>
+                <a:ea typeface="Lato"/>
+                <a:cs typeface="Lato"/>
+                <a:sym typeface="Lato"/>
+              </a:rPr>
+              <a:t>	-  Create “Select *” script to check results	</a:t>
+            </a:r>
+          </a:p>
+          <a:p>
+            <a:pPr lvl="2">
+              <a:lnSpc>
+                <a:spcPct val="115000"/>
+              </a:lnSpc>
+            </a:pPr>
+            <a:endParaRPr lang="en-US" sz="2000" dirty="0">
+              <a:solidFill>
+                <a:schemeClr val="accent1"/>
+              </a:solidFill>
+              <a:latin typeface="Lato"/>
+              <a:ea typeface="Lato"/>
+              <a:cs typeface="Lato"/>
+              <a:sym typeface="Lato"/>
+            </a:endParaRPr>
+          </a:p>
+          <a:p>
+            <a:pPr marL="457200" lvl="0" indent="-457200" algn="l" rtl="0">
+              <a:lnSpc>
+                <a:spcPct val="115000"/>
+              </a:lnSpc>
+              <a:spcBef>
+                <a:spcPts val="0"/>
+              </a:spcBef>
+              <a:spcAft>
+                <a:spcPts val="0"/>
+              </a:spcAft>
+              <a:buAutoNum type="arabicParenR"/>
+            </a:pPr>
+            <a:endParaRPr lang="en-US" sz="2000" dirty="0">
+              <a:solidFill>
+                <a:schemeClr val="accent1"/>
+              </a:solidFill>
+              <a:latin typeface="Lato"/>
+              <a:ea typeface="Lato"/>
+              <a:cs typeface="Lato"/>
+              <a:sym typeface="Lato"/>
+            </a:endParaRPr>
+          </a:p>
+          <a:p>
+            <a:pPr lvl="2">
+              <a:lnSpc>
+                <a:spcPct val="115000"/>
+              </a:lnSpc>
+            </a:pPr>
+            <a:r>
+              <a:rPr lang="en-US" sz="2000" dirty="0">
+                <a:solidFill>
+                  <a:schemeClr val="accent1"/>
+                </a:solidFill>
+                <a:latin typeface="Lato"/>
+                <a:ea typeface="Lato"/>
+                <a:cs typeface="Lato"/>
+                <a:sym typeface="Lato"/>
+              </a:rPr>
+              <a:t>	</a:t>
+            </a:r>
+          </a:p>
+          <a:p>
+            <a:pPr marL="457200" lvl="0" indent="-457200" algn="l" rtl="0">
+              <a:lnSpc>
+                <a:spcPct val="115000"/>
+              </a:lnSpc>
+              <a:spcBef>
+                <a:spcPts val="0"/>
+              </a:spcBef>
+              <a:spcAft>
+                <a:spcPts val="0"/>
+              </a:spcAft>
+              <a:buAutoNum type="arabicParenR"/>
+            </a:pPr>
+            <a:endParaRPr lang="en-US" sz="2400" dirty="0">
+              <a:solidFill>
+                <a:schemeClr val="accent1"/>
+              </a:solidFill>
+              <a:latin typeface="Lato"/>
+              <a:ea typeface="Lato"/>
+              <a:cs typeface="Lato"/>
+              <a:sym typeface="Lato"/>
+            </a:endParaRPr>
+          </a:p>
+        </p:txBody>
+      </p:sp>
+      <p:sp>
+        <p:nvSpPr>
+          <p:cNvPr id="11" name="Google Shape;274;p39">
+            <a:extLst>
+              <a:ext uri="{FF2B5EF4-FFF2-40B4-BE49-F238E27FC236}">
+                <a16:creationId xmlns:a16="http://schemas.microsoft.com/office/drawing/2014/main" id="{B0432C92-961A-4D06-B9F2-FF82A2ED768F}"/>
+              </a:ext>
+            </a:extLst>
+          </p:cNvPr>
+          <p:cNvSpPr txBox="1"/>
+          <p:nvPr/>
+        </p:nvSpPr>
+        <p:spPr>
+          <a:xfrm>
+            <a:off x="6572791" y="5115433"/>
+            <a:ext cx="5122673" cy="443971"/>
+          </a:xfrm>
+          <a:prstGeom prst="rect">
+            <a:avLst/>
+          </a:prstGeom>
+          <a:noFill/>
+          <a:ln>
+            <a:noFill/>
+          </a:ln>
+        </p:spPr>
+        <p:txBody>
+          <a:bodyPr spcFirstLastPara="1" wrap="square" lIns="91425" tIns="91425" rIns="91425" bIns="91425" anchor="t" anchorCtr="0">
+            <a:noAutofit/>
+          </a:bodyPr>
+          <a:lstStyle/>
+          <a:p>
+            <a:pPr>
+              <a:lnSpc>
+                <a:spcPct val="115000"/>
+              </a:lnSpc>
+            </a:pPr>
+            <a:r>
+              <a:rPr lang="en-US" sz="1600" dirty="0">
+                <a:latin typeface="Lato"/>
+                <a:ea typeface="Lato"/>
+                <a:cs typeface="Lato"/>
+                <a:sym typeface="Lato"/>
+              </a:rPr>
+              <a:t>Example: </a:t>
+            </a:r>
+            <a:r>
+              <a:rPr lang="en-US" dirty="0">
+                <a:hlinkClick r:id="rId4"/>
+              </a:rPr>
+              <a:t>https://www.youtube.com/watch?v=vzYFZXI43hM</a:t>
+            </a:r>
+            <a:endParaRPr lang="en-US" dirty="0"/>
+          </a:p>
+        </p:txBody>
+      </p:sp>
+    </p:spTree>
+    <p:extLst>
+      <p:ext uri="{BB962C8B-B14F-4D97-AF65-F5344CB8AC3E}">
+        <p14:creationId xmlns:p14="http://schemas.microsoft.com/office/powerpoint/2010/main" val="2110584022"/>
+      </p:ext>
+    </p:extLst>
   </p:cSld>
   <p:clrMapOvr>
     <a:masterClrMapping/>

</xml_diff>